<commit_message>
Updated Mgmt Tools Intro module
</commit_message>
<xml_diff>
--- a/modules/MgmntTools/PPT.pptx
+++ b/modules/MgmntTools/PPT.pptx
@@ -17,7 +17,7 @@
     <p:sldId id="296" r:id="rId5"/>
     <p:sldId id="308" r:id="rId6"/>
     <p:sldId id="276" r:id="rId7"/>
-    <p:sldId id="309" r:id="rId8"/>
+    <p:sldId id="310" r:id="rId8"/>
     <p:sldId id="281" r:id="rId9"/>
     <p:sldId id="306" r:id="rId10"/>
     <p:sldId id="279" r:id="rId11"/>
@@ -9931,25 +9931,13 @@
             <a:pPr lvl="2"/>
             <a:r>
               <a:rPr lang="en-US" dirty="0" smtClean="0"/>
-              <a:t>No motor trolling.</a:t>
-            </a:r>
-          </a:p>
-          <a:p>
-            <a:pPr lvl="2"/>
-            <a:endParaRPr lang="en-US" dirty="0"/>
-          </a:p>
-          <a:p>
+              <a:t>No motor trolling</a:t>
+            </a:r>
             <a:r>
               <a:rPr lang="en-US" dirty="0" smtClean="0"/>
-              <a:t>Commercial</a:t>
-            </a:r>
-          </a:p>
-          <a:p>
-            <a:pPr lvl="1"/>
-            <a:r>
-              <a:rPr lang="en-US" dirty="0" smtClean="0"/>
-              <a:t>Fishers are restricted to types/sizes of gear.</a:t>
-            </a:r>
+              <a:t>.</a:t>
+            </a:r>
+            <a:endParaRPr lang="en-US" dirty="0" smtClean="0"/>
           </a:p>
         </p:txBody>
       </p:sp>
@@ -10023,7 +10011,7 @@
         </p:blipFill>
         <p:spPr bwMode="auto">
           <a:xfrm>
-            <a:off x="5638800" y="1143000"/>
+            <a:off x="5676900" y="2407763"/>
             <a:ext cx="3048000" cy="4069237"/>
           </a:xfrm>
           <a:prstGeom prst="rect">
@@ -10041,324 +10029,6 @@
           </a:extLst>
         </p:spPr>
       </p:pic>
-      <p:pic>
-        <p:nvPicPr>
-          <p:cNvPr id="10" name="Picture 2"/>
-          <p:cNvPicPr>
-            <a:picLocks noChangeAspect="1" noChangeArrowheads="1"/>
-          </p:cNvPicPr>
-          <p:nvPr/>
-        </p:nvPicPr>
-        <p:blipFill>
-          <a:blip r:embed="rId3">
-            <a:extLst>
-              <a:ext uri="{28A0092B-C50C-407E-A947-70E740481C1C}">
-                <a14:useLocalDpi xmlns:a14="http://schemas.microsoft.com/office/drawing/2010/main" val="0"/>
-              </a:ext>
-            </a:extLst>
-          </a:blip>
-          <a:srcRect/>
-          <a:stretch>
-            <a:fillRect/>
-          </a:stretch>
-        </p:blipFill>
-        <p:spPr bwMode="auto">
-          <a:xfrm>
-            <a:off x="15397" y="2624137"/>
-            <a:ext cx="9052403" cy="3552825"/>
-          </a:xfrm>
-          <a:prstGeom prst="rect">
-            <a:avLst/>
-          </a:prstGeom>
-          <a:noFill/>
-          <a:ln>
-            <a:noFill/>
-          </a:ln>
-          <a:extLst>
-            <a:ext uri="{909E8E84-426E-40DD-AFC4-6F175D3DCCD1}">
-              <a14:hiddenFill xmlns:a14="http://schemas.microsoft.com/office/drawing/2010/main">
-                <a:solidFill>
-                  <a:schemeClr val="accent1"/>
-                </a:solidFill>
-              </a14:hiddenFill>
-            </a:ext>
-            <a:ext uri="{91240B29-F687-4F45-9708-019B960494DF}">
-              <a14:hiddenLine xmlns:a14="http://schemas.microsoft.com/office/drawing/2010/main" w="9525">
-                <a:solidFill>
-                  <a:schemeClr val="tx1"/>
-                </a:solidFill>
-                <a:miter lim="800000"/>
-                <a:headEnd/>
-                <a:tailEnd/>
-              </a14:hiddenLine>
-            </a:ext>
-          </a:extLst>
-        </p:spPr>
-      </p:pic>
-      <p:grpSp>
-        <p:nvGrpSpPr>
-          <p:cNvPr id="11" name="Group 10"/>
-          <p:cNvGrpSpPr/>
-          <p:nvPr/>
-        </p:nvGrpSpPr>
-        <p:grpSpPr>
-          <a:xfrm>
-            <a:off x="1478905" y="4552950"/>
-            <a:ext cx="6343650" cy="2228850"/>
-            <a:chOff x="1408801" y="3886200"/>
-            <a:chExt cx="6343650" cy="2228850"/>
-          </a:xfrm>
-        </p:grpSpPr>
-        <p:pic>
-          <p:nvPicPr>
-            <p:cNvPr id="12" name="Picture 3"/>
-            <p:cNvPicPr>
-              <a:picLocks noChangeAspect="1" noChangeArrowheads="1"/>
-            </p:cNvPicPr>
-            <p:nvPr/>
-          </p:nvPicPr>
-          <p:blipFill>
-            <a:blip r:embed="rId4">
-              <a:extLst>
-                <a:ext uri="{28A0092B-C50C-407E-A947-70E740481C1C}">
-                  <a14:useLocalDpi xmlns:a14="http://schemas.microsoft.com/office/drawing/2010/main" val="0"/>
-                </a:ext>
-              </a:extLst>
-            </a:blip>
-            <a:srcRect/>
-            <a:stretch>
-              <a:fillRect/>
-            </a:stretch>
-          </p:blipFill>
-          <p:spPr bwMode="auto">
-            <a:xfrm>
-              <a:off x="1408801" y="3886200"/>
-              <a:ext cx="6343650" cy="2228850"/>
-            </a:xfrm>
-            <a:prstGeom prst="rect">
-              <a:avLst/>
-            </a:prstGeom>
-            <a:noFill/>
-            <a:ln>
-              <a:noFill/>
-            </a:ln>
-            <a:extLst>
-              <a:ext uri="{909E8E84-426E-40DD-AFC4-6F175D3DCCD1}">
-                <a14:hiddenFill xmlns:a14="http://schemas.microsoft.com/office/drawing/2010/main">
-                  <a:solidFill>
-                    <a:schemeClr val="accent1"/>
-                  </a:solidFill>
-                </a14:hiddenFill>
-              </a:ext>
-              <a:ext uri="{91240B29-F687-4F45-9708-019B960494DF}">
-                <a14:hiddenLine xmlns:a14="http://schemas.microsoft.com/office/drawing/2010/main" w="9525">
-                  <a:solidFill>
-                    <a:schemeClr val="tx1"/>
-                  </a:solidFill>
-                  <a:miter lim="800000"/>
-                  <a:headEnd/>
-                  <a:tailEnd/>
-                </a14:hiddenLine>
-              </a:ext>
-            </a:extLst>
-          </p:spPr>
-        </p:pic>
-        <p:sp>
-          <p:nvSpPr>
-            <p:cNvPr id="13" name="Rectangle 12"/>
-            <p:cNvSpPr/>
-            <p:nvPr/>
-          </p:nvSpPr>
-          <p:spPr bwMode="auto">
-            <a:xfrm>
-              <a:off x="6096000" y="4451230"/>
-              <a:ext cx="1143000" cy="196970"/>
-            </a:xfrm>
-            <a:prstGeom prst="rect">
-              <a:avLst/>
-            </a:prstGeom>
-            <a:solidFill>
-              <a:srgbClr val="C00000">
-                <a:alpha val="15000"/>
-              </a:srgbClr>
-            </a:solidFill>
-            <a:ln w="9525" cap="flat" cmpd="sng" algn="ctr">
-              <a:noFill/>
-              <a:prstDash val="solid"/>
-              <a:round/>
-              <a:headEnd type="none" w="med" len="med"/>
-              <a:tailEnd type="none" w="med" len="med"/>
-            </a:ln>
-            <a:effectLst/>
-          </p:spPr>
-          <p:txBody>
-            <a:bodyPr vert="horz" wrap="square" lIns="91440" tIns="45720" rIns="91440" bIns="45720" numCol="1" rtlCol="0" anchor="t" anchorCtr="0" compatLnSpc="1">
-              <a:prstTxWarp prst="textNoShape">
-                <a:avLst/>
-              </a:prstTxWarp>
-            </a:bodyPr>
-            <a:lstStyle/>
-            <a:p>
-              <a:pPr marL="0" marR="0" indent="0" algn="l" defTabSz="914400" rtl="0" eaLnBrk="1" fontAlgn="base" latinLnBrk="0" hangingPunct="1">
-                <a:lnSpc>
-                  <a:spcPct val="100000"/>
-                </a:lnSpc>
-                <a:spcBef>
-                  <a:spcPct val="0"/>
-                </a:spcBef>
-                <a:spcAft>
-                  <a:spcPct val="0"/>
-                </a:spcAft>
-                <a:buClrTx/>
-                <a:buSzTx/>
-                <a:buFontTx/>
-                <a:buNone/>
-                <a:tabLst/>
-              </a:pPr>
-              <a:endParaRPr kumimoji="0" lang="en-US" sz="2800" b="1" i="0" u="none" strike="noStrike" cap="none" normalizeH="0" baseline="0" smtClean="0">
-                <a:ln>
-                  <a:noFill/>
-                </a:ln>
-                <a:solidFill>
-                  <a:schemeClr val="tx1"/>
-                </a:solidFill>
-                <a:effectLst/>
-                <a:latin typeface="Arial" charset="0"/>
-              </a:endParaRPr>
-            </a:p>
-          </p:txBody>
-        </p:sp>
-        <p:sp>
-          <p:nvSpPr>
-            <p:cNvPr id="14" name="Rectangle 13"/>
-            <p:cNvSpPr/>
-            <p:nvPr/>
-          </p:nvSpPr>
-          <p:spPr bwMode="auto">
-            <a:xfrm>
-              <a:off x="1447800" y="4603630"/>
-              <a:ext cx="4267200" cy="654170"/>
-            </a:xfrm>
-            <a:prstGeom prst="rect">
-              <a:avLst/>
-            </a:prstGeom>
-            <a:solidFill>
-              <a:srgbClr val="C00000">
-                <a:alpha val="15000"/>
-              </a:srgbClr>
-            </a:solidFill>
-            <a:ln w="9525" cap="flat" cmpd="sng" algn="ctr">
-              <a:noFill/>
-              <a:prstDash val="solid"/>
-              <a:round/>
-              <a:headEnd type="none" w="med" len="med"/>
-              <a:tailEnd type="none" w="med" len="med"/>
-            </a:ln>
-            <a:effectLst/>
-          </p:spPr>
-          <p:txBody>
-            <a:bodyPr vert="horz" wrap="square" lIns="91440" tIns="45720" rIns="91440" bIns="45720" numCol="1" rtlCol="0" anchor="t" anchorCtr="0" compatLnSpc="1">
-              <a:prstTxWarp prst="textNoShape">
-                <a:avLst/>
-              </a:prstTxWarp>
-            </a:bodyPr>
-            <a:lstStyle/>
-            <a:p>
-              <a:pPr marL="0" marR="0" indent="0" algn="l" defTabSz="914400" rtl="0" eaLnBrk="1" fontAlgn="base" latinLnBrk="0" hangingPunct="1">
-                <a:lnSpc>
-                  <a:spcPct val="100000"/>
-                </a:lnSpc>
-                <a:spcBef>
-                  <a:spcPct val="0"/>
-                </a:spcBef>
-                <a:spcAft>
-                  <a:spcPct val="0"/>
-                </a:spcAft>
-                <a:buClrTx/>
-                <a:buSzTx/>
-                <a:buFontTx/>
-                <a:buNone/>
-                <a:tabLst/>
-              </a:pPr>
-              <a:endParaRPr kumimoji="0" lang="en-US" sz="2800" b="1" i="0" u="none" strike="noStrike" cap="none" normalizeH="0" baseline="0" smtClean="0">
-                <a:ln>
-                  <a:noFill/>
-                </a:ln>
-                <a:solidFill>
-                  <a:schemeClr val="tx1"/>
-                </a:solidFill>
-                <a:effectLst/>
-                <a:latin typeface="Arial" charset="0"/>
-              </a:endParaRPr>
-            </a:p>
-          </p:txBody>
-        </p:sp>
-        <p:sp>
-          <p:nvSpPr>
-            <p:cNvPr id="15" name="Rectangle 14"/>
-            <p:cNvSpPr/>
-            <p:nvPr/>
-          </p:nvSpPr>
-          <p:spPr bwMode="auto">
-            <a:xfrm>
-              <a:off x="1447800" y="5256775"/>
-              <a:ext cx="3322608" cy="182393"/>
-            </a:xfrm>
-            <a:prstGeom prst="rect">
-              <a:avLst/>
-            </a:prstGeom>
-            <a:solidFill>
-              <a:srgbClr val="C00000">
-                <a:alpha val="15000"/>
-              </a:srgbClr>
-            </a:solidFill>
-            <a:ln w="9525" cap="flat" cmpd="sng" algn="ctr">
-              <a:noFill/>
-              <a:prstDash val="solid"/>
-              <a:round/>
-              <a:headEnd type="none" w="med" len="med"/>
-              <a:tailEnd type="none" w="med" len="med"/>
-            </a:ln>
-            <a:effectLst/>
-          </p:spPr>
-          <p:txBody>
-            <a:bodyPr vert="horz" wrap="square" lIns="91440" tIns="45720" rIns="91440" bIns="45720" numCol="1" rtlCol="0" anchor="t" anchorCtr="0" compatLnSpc="1">
-              <a:prstTxWarp prst="textNoShape">
-                <a:avLst/>
-              </a:prstTxWarp>
-            </a:bodyPr>
-            <a:lstStyle/>
-            <a:p>
-              <a:pPr marL="0" marR="0" indent="0" algn="l" defTabSz="914400" rtl="0" eaLnBrk="1" fontAlgn="base" latinLnBrk="0" hangingPunct="1">
-                <a:lnSpc>
-                  <a:spcPct val="100000"/>
-                </a:lnSpc>
-                <a:spcBef>
-                  <a:spcPct val="0"/>
-                </a:spcBef>
-                <a:spcAft>
-                  <a:spcPct val="0"/>
-                </a:spcAft>
-                <a:buClrTx/>
-                <a:buSzTx/>
-                <a:buFontTx/>
-                <a:buNone/>
-                <a:tabLst/>
-              </a:pPr>
-              <a:endParaRPr kumimoji="0" lang="en-US" sz="2800" b="1" i="0" u="none" strike="noStrike" cap="none" normalizeH="0" baseline="0" smtClean="0">
-                <a:ln>
-                  <a:noFill/>
-                </a:ln>
-                <a:solidFill>
-                  <a:schemeClr val="tx1"/>
-                </a:solidFill>
-                <a:effectLst/>
-                <a:latin typeface="Arial" charset="0"/>
-              </a:endParaRPr>
-            </a:p>
-          </p:txBody>
-        </p:sp>
-      </p:grpSp>
     </p:spTree>
   </p:cSld>
   <p:clrMapOvr>
@@ -10417,248 +10087,6 @@
                       </p:childTnLst>
                     </p:cTn>
                   </p:par>
-                  <p:par>
-                    <p:cTn id="7" fill="hold">
-                      <p:stCondLst>
-                        <p:cond delay="indefinite"/>
-                      </p:stCondLst>
-                      <p:childTnLst>
-                        <p:par>
-                          <p:cTn id="8" fill="hold">
-                            <p:stCondLst>
-                              <p:cond delay="0"/>
-                            </p:stCondLst>
-                            <p:childTnLst>
-                              <p:par>
-                                <p:cTn id="9" presetID="1" presetClass="exit" presetSubtype="0" fill="hold" nodeType="clickEffect">
-                                  <p:stCondLst>
-                                    <p:cond delay="0"/>
-                                  </p:stCondLst>
-                                  <p:childTnLst>
-                                    <p:set>
-                                      <p:cBhvr>
-                                        <p:cTn id="10" dur="1" fill="hold">
-                                          <p:stCondLst>
-                                            <p:cond delay="0"/>
-                                          </p:stCondLst>
-                                        </p:cTn>
-                                        <p:tgtEl>
-                                          <p:spTgt spid="10242"/>
-                                        </p:tgtEl>
-                                        <p:attrNameLst>
-                                          <p:attrName>style.visibility</p:attrName>
-                                        </p:attrNameLst>
-                                      </p:cBhvr>
-                                      <p:to>
-                                        <p:strVal val="hidden"/>
-                                      </p:to>
-                                    </p:set>
-                                  </p:childTnLst>
-                                </p:cTn>
-                              </p:par>
-                            </p:childTnLst>
-                          </p:cTn>
-                        </p:par>
-                        <p:par>
-                          <p:cTn id="11" fill="hold">
-                            <p:stCondLst>
-                              <p:cond delay="0"/>
-                            </p:stCondLst>
-                            <p:childTnLst>
-                              <p:par>
-                                <p:cTn id="12" presetID="1" presetClass="entr" presetSubtype="0" fill="hold" grpId="0" nodeType="afterEffect">
-                                  <p:stCondLst>
-                                    <p:cond delay="0"/>
-                                  </p:stCondLst>
-                                  <p:childTnLst>
-                                    <p:set>
-                                      <p:cBhvr>
-                                        <p:cTn id="13" dur="1" fill="hold">
-                                          <p:stCondLst>
-                                            <p:cond delay="0"/>
-                                          </p:stCondLst>
-                                        </p:cTn>
-                                        <p:tgtEl>
-                                          <p:spTgt spid="3">
-                                            <p:txEl>
-                                              <p:pRg st="7" end="7"/>
-                                            </p:txEl>
-                                          </p:spTgt>
-                                        </p:tgtEl>
-                                        <p:attrNameLst>
-                                          <p:attrName>style.visibility</p:attrName>
-                                        </p:attrNameLst>
-                                      </p:cBhvr>
-                                      <p:to>
-                                        <p:strVal val="visible"/>
-                                      </p:to>
-                                    </p:set>
-                                  </p:childTnLst>
-                                </p:cTn>
-                              </p:par>
-                              <p:par>
-                                <p:cTn id="14" presetID="1" presetClass="entr" presetSubtype="0" fill="hold" grpId="0" nodeType="withEffect">
-                                  <p:stCondLst>
-                                    <p:cond delay="0"/>
-                                  </p:stCondLst>
-                                  <p:childTnLst>
-                                    <p:set>
-                                      <p:cBhvr>
-                                        <p:cTn id="15" dur="1" fill="hold">
-                                          <p:stCondLst>
-                                            <p:cond delay="0"/>
-                                          </p:stCondLst>
-                                        </p:cTn>
-                                        <p:tgtEl>
-                                          <p:spTgt spid="3">
-                                            <p:txEl>
-                                              <p:pRg st="8" end="8"/>
-                                            </p:txEl>
-                                          </p:spTgt>
-                                        </p:tgtEl>
-                                        <p:attrNameLst>
-                                          <p:attrName>style.visibility</p:attrName>
-                                        </p:attrNameLst>
-                                      </p:cBhvr>
-                                      <p:to>
-                                        <p:strVal val="visible"/>
-                                      </p:to>
-                                    </p:set>
-                                  </p:childTnLst>
-                                </p:cTn>
-                              </p:par>
-                            </p:childTnLst>
-                          </p:cTn>
-                        </p:par>
-                      </p:childTnLst>
-                    </p:cTn>
-                  </p:par>
-                  <p:par>
-                    <p:cTn id="16" fill="hold">
-                      <p:stCondLst>
-                        <p:cond delay="indefinite"/>
-                      </p:stCondLst>
-                      <p:childTnLst>
-                        <p:par>
-                          <p:cTn id="17" fill="hold">
-                            <p:stCondLst>
-                              <p:cond delay="0"/>
-                            </p:stCondLst>
-                            <p:childTnLst>
-                              <p:par>
-                                <p:cTn id="18" presetID="1" presetClass="entr" presetSubtype="0" fill="hold" nodeType="clickEffect">
-                                  <p:stCondLst>
-                                    <p:cond delay="0"/>
-                                  </p:stCondLst>
-                                  <p:childTnLst>
-                                    <p:set>
-                                      <p:cBhvr>
-                                        <p:cTn id="19" dur="1" fill="hold">
-                                          <p:stCondLst>
-                                            <p:cond delay="0"/>
-                                          </p:stCondLst>
-                                        </p:cTn>
-                                        <p:tgtEl>
-                                          <p:spTgt spid="10"/>
-                                        </p:tgtEl>
-                                        <p:attrNameLst>
-                                          <p:attrName>style.visibility</p:attrName>
-                                        </p:attrNameLst>
-                                      </p:cBhvr>
-                                      <p:to>
-                                        <p:strVal val="visible"/>
-                                      </p:to>
-                                    </p:set>
-                                  </p:childTnLst>
-                                </p:cTn>
-                              </p:par>
-                            </p:childTnLst>
-                          </p:cTn>
-                        </p:par>
-                      </p:childTnLst>
-                    </p:cTn>
-                  </p:par>
-                  <p:par>
-                    <p:cTn id="20" fill="hold">
-                      <p:stCondLst>
-                        <p:cond delay="indefinite"/>
-                      </p:stCondLst>
-                      <p:childTnLst>
-                        <p:par>
-                          <p:cTn id="21" fill="hold">
-                            <p:stCondLst>
-                              <p:cond delay="0"/>
-                            </p:stCondLst>
-                            <p:childTnLst>
-                              <p:par>
-                                <p:cTn id="22" presetID="1" presetClass="exit" presetSubtype="0" fill="hold" nodeType="clickEffect">
-                                  <p:stCondLst>
-                                    <p:cond delay="0"/>
-                                  </p:stCondLst>
-                                  <p:childTnLst>
-                                    <p:set>
-                                      <p:cBhvr>
-                                        <p:cTn id="23" dur="1" fill="hold">
-                                          <p:stCondLst>
-                                            <p:cond delay="0"/>
-                                          </p:stCondLst>
-                                        </p:cTn>
-                                        <p:tgtEl>
-                                          <p:spTgt spid="10"/>
-                                        </p:tgtEl>
-                                        <p:attrNameLst>
-                                          <p:attrName>style.visibility</p:attrName>
-                                        </p:attrNameLst>
-                                      </p:cBhvr>
-                                      <p:to>
-                                        <p:strVal val="hidden"/>
-                                      </p:to>
-                                    </p:set>
-                                  </p:childTnLst>
-                                </p:cTn>
-                              </p:par>
-                            </p:childTnLst>
-                          </p:cTn>
-                        </p:par>
-                        <p:par>
-                          <p:cTn id="24" fill="hold">
-                            <p:stCondLst>
-                              <p:cond delay="0"/>
-                            </p:stCondLst>
-                            <p:childTnLst>
-                              <p:par>
-                                <p:cTn id="25" presetID="1" presetClass="entr" presetSubtype="0" fill="hold" nodeType="afterEffect">
-                                  <p:stCondLst>
-                                    <p:cond delay="0"/>
-                                  </p:stCondLst>
-                                  <p:childTnLst>
-                                    <p:set>
-                                      <p:cBhvr>
-                                        <p:cTn id="26" dur="1" fill="hold">
-                                          <p:stCondLst>
-                                            <p:cond delay="0"/>
-                                          </p:stCondLst>
-                                        </p:cTn>
-                                        <p:tgtEl>
-                                          <p:spTgt spid="11"/>
-                                        </p:tgtEl>
-                                        <p:attrNameLst>
-                                          <p:attrName>style.visibility</p:attrName>
-                                        </p:attrNameLst>
-                                      </p:cBhvr>
-                                      <p:to>
-                                        <p:strVal val="visible"/>
-                                      </p:to>
-                                    </p:set>
-                                  </p:childTnLst>
-                                </p:cTn>
-                              </p:par>
-                            </p:childTnLst>
-                          </p:cTn>
-                        </p:par>
-                      </p:childTnLst>
-                    </p:cTn>
-                  </p:par>
                 </p:childTnLst>
               </p:cTn>
               <p:prevCondLst>
@@ -10680,9 +10108,6 @@
         </p:cTn>
       </p:par>
     </p:tnLst>
-    <p:bldLst>
-      <p:bldP spid="3" grpId="0" uiExpand="1" build="p"/>
-    </p:bldLst>
   </p:timing>
 </p:sld>
 </file>
@@ -10729,6 +10154,85 @@
       </p:sp>
       <p:sp>
         <p:nvSpPr>
+          <p:cNvPr id="3" name="Content Placeholder 2"/>
+          <p:cNvSpPr>
+            <a:spLocks noGrp="1"/>
+          </p:cNvSpPr>
+          <p:nvPr>
+            <p:ph idx="1"/>
+          </p:nvPr>
+        </p:nvSpPr>
+        <p:spPr>
+          <a:xfrm>
+            <a:off x="228600" y="1143000"/>
+            <a:ext cx="8763000" cy="5334000"/>
+          </a:xfrm>
+        </p:spPr>
+        <p:txBody>
+          <a:bodyPr/>
+          <a:lstStyle/>
+          <a:p>
+            <a:r>
+              <a:rPr lang="en-US" dirty="0" smtClean="0"/>
+              <a:t>Recreational</a:t>
+            </a:r>
+          </a:p>
+          <a:p>
+            <a:pPr lvl="1"/>
+            <a:r>
+              <a:rPr lang="en-US" dirty="0" smtClean="0"/>
+              <a:t>Anglers are restricted to certain types of gear.</a:t>
+            </a:r>
+          </a:p>
+          <a:p>
+            <a:pPr lvl="2"/>
+            <a:r>
+              <a:rPr lang="en-US" dirty="0" smtClean="0"/>
+              <a:t>Artificial lures only.</a:t>
+            </a:r>
+          </a:p>
+          <a:p>
+            <a:pPr lvl="2"/>
+            <a:r>
+              <a:rPr lang="en-US" dirty="0" smtClean="0"/>
+              <a:t>Barbless hooks.</a:t>
+            </a:r>
+          </a:p>
+          <a:p>
+            <a:pPr lvl="2"/>
+            <a:r>
+              <a:rPr lang="en-US" dirty="0" smtClean="0"/>
+              <a:t>Only three lines.</a:t>
+            </a:r>
+          </a:p>
+          <a:p>
+            <a:pPr lvl="2"/>
+            <a:r>
+              <a:rPr lang="en-US" dirty="0" smtClean="0"/>
+              <a:t>No motor trolling.</a:t>
+            </a:r>
+          </a:p>
+          <a:p>
+            <a:pPr lvl="2"/>
+            <a:endParaRPr lang="en-US" dirty="0"/>
+          </a:p>
+          <a:p>
+            <a:r>
+              <a:rPr lang="en-US" dirty="0" smtClean="0"/>
+              <a:t>Commercial</a:t>
+            </a:r>
+          </a:p>
+          <a:p>
+            <a:pPr lvl="1"/>
+            <a:r>
+              <a:rPr lang="en-US" dirty="0" smtClean="0"/>
+              <a:t>Fishers are restricted to types/sizes of gear.</a:t>
+            </a:r>
+          </a:p>
+        </p:txBody>
+      </p:sp>
+      <p:sp>
+        <p:nvSpPr>
           <p:cNvPr id="4" name="Footer Placeholder 3"/>
           <p:cNvSpPr>
             <a:spLocks noGrp="1"/>
@@ -10797,7 +10301,7 @@
         </p:blipFill>
         <p:spPr bwMode="auto">
           <a:xfrm>
-            <a:off x="45004" y="1206440"/>
+            <a:off x="0" y="990600"/>
             <a:ext cx="9052403" cy="3552825"/>
           </a:xfrm>
           <a:prstGeom prst="rect">
@@ -10836,8 +10340,8 @@
         </p:nvGrpSpPr>
         <p:grpSpPr>
           <a:xfrm>
-            <a:off x="2076450" y="4321175"/>
-            <a:ext cx="6343650" cy="2228850"/>
+            <a:off x="65088" y="1066800"/>
+            <a:ext cx="8393112" cy="3457575"/>
             <a:chOff x="1408801" y="3886200"/>
             <a:chExt cx="6343650" cy="2228850"/>
           </a:xfrm>
@@ -11095,7 +10599,7 @@
     </p:spTree>
     <p:extLst>
       <p:ext uri="{BB962C8B-B14F-4D97-AF65-F5344CB8AC3E}">
-        <p14:creationId xmlns:p14="http://schemas.microsoft.com/office/powerpoint/2010/main" val="4076131983"/>
+        <p14:creationId xmlns:p14="http://schemas.microsoft.com/office/powerpoint/2010/main" val="1484105173"/>
       </p:ext>
     </p:extLst>
   </p:cSld>

</xml_diff>